<commit_message>
added cluster setup steps
</commit_message>
<xml_diff>
--- a/Progress/3 Project Progress.pptx
+++ b/Progress/3 Project Progress.pptx
@@ -291,7 +291,7 @@
   <pc:docChgLst>
     <pc:chgData name="Kyriacos Kyriacou" userId="6a303e1966778a2b" providerId="LiveId" clId="{F7E42C5A-0DD8-4ABF-A584-0915E0F2992F}"/>
     <pc:docChg chg="undo redo custSel delSld modSld">
-      <pc:chgData name="Kyriacos Kyriacou" userId="6a303e1966778a2b" providerId="LiveId" clId="{F7E42C5A-0DD8-4ABF-A584-0915E0F2992F}" dt="2023-06-05T18:14:21.620" v="1338" actId="20577"/>
+      <pc:chgData name="Kyriacos Kyriacou" userId="6a303e1966778a2b" providerId="LiveId" clId="{F7E42C5A-0DD8-4ABF-A584-0915E0F2992F}" dt="2023-06-06T10:43:41.464" v="1346" actId="20577"/>
       <pc:docMkLst>
         <pc:docMk/>
       </pc:docMkLst>
@@ -311,7 +311,7 @@
         </pc:spChg>
       </pc:sldChg>
       <pc:sldChg chg="modSp mod">
-        <pc:chgData name="Kyriacos Kyriacou" userId="6a303e1966778a2b" providerId="LiveId" clId="{F7E42C5A-0DD8-4ABF-A584-0915E0F2992F}" dt="2023-06-05T18:14:21.620" v="1338" actId="20577"/>
+        <pc:chgData name="Kyriacos Kyriacou" userId="6a303e1966778a2b" providerId="LiveId" clId="{F7E42C5A-0DD8-4ABF-A584-0915E0F2992F}" dt="2023-06-06T10:43:41.464" v="1346" actId="20577"/>
         <pc:sldMkLst>
           <pc:docMk/>
           <pc:sldMk cId="0" sldId="257"/>
@@ -325,7 +325,7 @@
           </ac:spMkLst>
         </pc:spChg>
         <pc:spChg chg="mod">
-          <ac:chgData name="Kyriacos Kyriacou" userId="6a303e1966778a2b" providerId="LiveId" clId="{F7E42C5A-0DD8-4ABF-A584-0915E0F2992F}" dt="2023-06-05T18:14:21.620" v="1338" actId="20577"/>
+          <ac:chgData name="Kyriacos Kyriacou" userId="6a303e1966778a2b" providerId="LiveId" clId="{F7E42C5A-0DD8-4ABF-A584-0915E0F2992F}" dt="2023-06-06T10:43:41.464" v="1346" actId="20577"/>
           <ac:spMkLst>
             <pc:docMk/>
             <pc:sldMk cId="0" sldId="257"/>
@@ -624,7 +624,7 @@
               <a:pPr>
                 <a:defRPr/>
               </a:pPr>
-              <a:t>6/5/2023</a:t>
+              <a:t>6/6/2023</a:t>
             </a:fld>
             <a:endParaRPr lang="en-US" altLang="en-US"/>
           </a:p>
@@ -816,7 +816,7 @@
               <a:pPr>
                 <a:defRPr/>
               </a:pPr>
-              <a:t>6/5/2023</a:t>
+              <a:t>6/6/2023</a:t>
             </a:fld>
             <a:endParaRPr lang="en-US" altLang="en-US"/>
           </a:p>
@@ -1018,7 +1018,7 @@
               <a:pPr>
                 <a:defRPr/>
               </a:pPr>
-              <a:t>6/5/2023</a:t>
+              <a:t>6/6/2023</a:t>
             </a:fld>
             <a:endParaRPr lang="en-US" altLang="en-US"/>
           </a:p>
@@ -1210,7 +1210,7 @@
               <a:pPr>
                 <a:defRPr/>
               </a:pPr>
-              <a:t>6/5/2023</a:t>
+              <a:t>6/6/2023</a:t>
             </a:fld>
             <a:endParaRPr lang="en-US" altLang="en-US"/>
           </a:p>
@@ -1478,7 +1478,7 @@
               <a:pPr>
                 <a:defRPr/>
               </a:pPr>
-              <a:t>6/5/2023</a:t>
+              <a:t>6/6/2023</a:t>
             </a:fld>
             <a:endParaRPr lang="en-US" altLang="en-US"/>
           </a:p>
@@ -1788,7 +1788,7 @@
               <a:pPr>
                 <a:defRPr/>
               </a:pPr>
-              <a:t>6/5/2023</a:t>
+              <a:t>6/6/2023</a:t>
             </a:fld>
             <a:endParaRPr lang="en-US" altLang="en-US"/>
           </a:p>
@@ -2232,7 +2232,7 @@
               <a:pPr>
                 <a:defRPr/>
               </a:pPr>
-              <a:t>6/5/2023</a:t>
+              <a:t>6/6/2023</a:t>
             </a:fld>
             <a:endParaRPr lang="en-US" altLang="en-US"/>
           </a:p>
@@ -2372,7 +2372,7 @@
               <a:pPr>
                 <a:defRPr/>
               </a:pPr>
-              <a:t>6/5/2023</a:t>
+              <a:t>6/6/2023</a:t>
             </a:fld>
             <a:endParaRPr lang="en-US" altLang="en-US"/>
           </a:p>
@@ -2489,7 +2489,7 @@
               <a:pPr>
                 <a:defRPr/>
               </a:pPr>
-              <a:t>6/5/2023</a:t>
+              <a:t>6/6/2023</a:t>
             </a:fld>
             <a:endParaRPr lang="en-US" altLang="en-US"/>
           </a:p>
@@ -2788,7 +2788,7 @@
               <a:pPr>
                 <a:defRPr/>
               </a:pPr>
-              <a:t>6/5/2023</a:t>
+              <a:t>6/6/2023</a:t>
             </a:fld>
             <a:endParaRPr lang="en-US" altLang="en-US"/>
           </a:p>
@@ -3070,7 +3070,7 @@
               <a:pPr>
                 <a:defRPr/>
               </a:pPr>
-              <a:t>6/5/2023</a:t>
+              <a:t>6/6/2023</a:t>
             </a:fld>
             <a:endParaRPr lang="en-US" altLang="en-US"/>
           </a:p>
@@ -3361,7 +3361,7 @@
               <a:pPr>
                 <a:defRPr/>
               </a:pPr>
-              <a:t>6/5/2023</a:t>
+              <a:t>6/6/2023</a:t>
             </a:fld>
             <a:endParaRPr lang="en-US" altLang="en-US"/>
           </a:p>
@@ -4128,7 +4128,7 @@
               <a:rPr lang="en-GB" altLang="en-US" sz="1600" dirty="0">
                 <a:latin typeface="Söhne"/>
               </a:rPr>
-              <a:t> – Legit?): Successfully trained on ML-1M dataset using CPU and GPUs via university cluster.                                                                               Results: epoch:200, time: 1081.933759(s) 18 min., valid (NDCG@10: 0.6218, HR@10: 0.8447), test (NDCG@10: 0.5909, HR@10: 0.8220)  - As expected.              This model uses BCE With Logits Loss (Sigmoid + BCE for numerical stability?)</a:t>
+              <a:t> – Legit?): Successfully trained on ML-1M dataset using CPU and GPUs via university cluster.                                                                               Results: epoch:200, time: 1081.933759(s) 18 min., valid (NDCG@10: 0.6218, HR@10: 0.8447), test (NDCG@10: 0.5909, HR@10: 0.8220)  - As in paper.              This model uses BCE With Logits Loss (Sigmoid + BCE for numerical stability?)</a:t>
             </a:r>
           </a:p>
           <a:p>

</xml_diff>